<commit_message>
Minor slide updates, up to lecture 10.
</commit_message>
<xml_diff>
--- a/doc/advanced/slides/lesson_08.pptx
+++ b/doc/advanced/slides/lesson_08.pptx
@@ -15,8 +15,8 @@
     <p:sldId id="260" r:id="rId6"/>
     <p:sldId id="261" r:id="rId7"/>
     <p:sldId id="263" r:id="rId8"/>
-    <p:sldId id="303" r:id="rId9"/>
-    <p:sldId id="266" r:id="rId10"/>
+    <p:sldId id="266" r:id="rId9"/>
+    <p:sldId id="303" r:id="rId10"/>
     <p:sldId id="267" r:id="rId11"/>
     <p:sldId id="268" r:id="rId12"/>
     <p:sldId id="269" r:id="rId13"/>
@@ -261,7 +261,7 @@
           <a:p>
             <a:fld id="{060F4727-23A3-441E-BA41-9534DD80814F}" type="datetimeFigureOut">
               <a:rPr lang="en-US" smtClean="0"/>
-              <a:t>9/20/20</a:t>
+              <a:t>10/10/21</a:t>
             </a:fld>
             <a:endParaRPr lang="en-US"/>
           </a:p>
@@ -572,6 +572,174 @@
           <a:bodyPr/>
           <a:lstStyle/>
           <a:p>
+            <a:endParaRPr lang="en-GB" dirty="0"/>
+          </a:p>
+        </p:txBody>
+      </p:sp>
+      <p:sp>
+        <p:nvSpPr>
+          <p:cNvPr id="4" name="Slide Number Placeholder 3"/>
+          <p:cNvSpPr>
+            <a:spLocks noGrp="1"/>
+          </p:cNvSpPr>
+          <p:nvPr>
+            <p:ph type="sldNum" sz="quarter" idx="5"/>
+          </p:nvPr>
+        </p:nvSpPr>
+        <p:spPr/>
+        <p:txBody>
+          <a:bodyPr/>
+          <a:lstStyle/>
+          <a:p>
+            <a:fld id="{11ADBA3B-C92D-4CFA-B969-3AFAA1A6C2A1}" type="slidenum">
+              <a:rPr lang="en-US" smtClean="0"/>
+              <a:t>1</a:t>
+            </a:fld>
+            <a:endParaRPr lang="en-US"/>
+          </a:p>
+        </p:txBody>
+      </p:sp>
+    </p:spTree>
+    <p:extLst>
+      <p:ext uri="{BB962C8B-B14F-4D97-AF65-F5344CB8AC3E}">
+        <p14:creationId xmlns:p14="http://schemas.microsoft.com/office/powerpoint/2010/main" val="3170705154"/>
+      </p:ext>
+    </p:extLst>
+  </p:cSld>
+  <p:clrMapOvr>
+    <a:masterClrMapping/>
+  </p:clrMapOvr>
+</p:notes>
+</file>
+
+<file path=ppt/notesSlides/notesSlide2.xml><?xml version="1.0" encoding="utf-8"?>
+<p:notes xmlns:a="http://schemas.openxmlformats.org/drawingml/2006/main" xmlns:r="http://schemas.openxmlformats.org/officeDocument/2006/relationships" xmlns:p="http://schemas.openxmlformats.org/presentationml/2006/main">
+  <p:cSld>
+    <p:spTree>
+      <p:nvGrpSpPr>
+        <p:cNvPr id="1" name=""/>
+        <p:cNvGrpSpPr/>
+        <p:nvPr/>
+      </p:nvGrpSpPr>
+      <p:grpSpPr>
+        <a:xfrm>
+          <a:off x="0" y="0"/>
+          <a:ext cx="0" cy="0"/>
+          <a:chOff x="0" y="0"/>
+          <a:chExt cx="0" cy="0"/>
+        </a:xfrm>
+      </p:grpSpPr>
+      <p:sp>
+        <p:nvSpPr>
+          <p:cNvPr id="2" name="Slide Image Placeholder 1"/>
+          <p:cNvSpPr>
+            <a:spLocks noGrp="1" noRot="1" noChangeAspect="1"/>
+          </p:cNvSpPr>
+          <p:nvPr>
+            <p:ph type="sldImg"/>
+          </p:nvPr>
+        </p:nvSpPr>
+        <p:spPr/>
+      </p:sp>
+      <p:sp>
+        <p:nvSpPr>
+          <p:cNvPr id="3" name="Notes Placeholder 2"/>
+          <p:cNvSpPr>
+            <a:spLocks noGrp="1"/>
+          </p:cNvSpPr>
+          <p:nvPr>
+            <p:ph type="body" idx="1"/>
+          </p:nvPr>
+        </p:nvSpPr>
+        <p:spPr/>
+        <p:txBody>
+          <a:bodyPr/>
+          <a:lstStyle/>
+          <a:p>
+            <a:endParaRPr lang="en-GB" dirty="0"/>
+          </a:p>
+        </p:txBody>
+      </p:sp>
+      <p:sp>
+        <p:nvSpPr>
+          <p:cNvPr id="4" name="Slide Number Placeholder 3"/>
+          <p:cNvSpPr>
+            <a:spLocks noGrp="1"/>
+          </p:cNvSpPr>
+          <p:nvPr>
+            <p:ph type="sldNum" sz="quarter" idx="5"/>
+          </p:nvPr>
+        </p:nvSpPr>
+        <p:spPr/>
+        <p:txBody>
+          <a:bodyPr/>
+          <a:lstStyle/>
+          <a:p>
+            <a:fld id="{11ADBA3B-C92D-4CFA-B969-3AFAA1A6C2A1}" type="slidenum">
+              <a:rPr lang="en-US" smtClean="0"/>
+              <a:t>62</a:t>
+            </a:fld>
+            <a:endParaRPr lang="en-US"/>
+          </a:p>
+        </p:txBody>
+      </p:sp>
+    </p:spTree>
+    <p:extLst>
+      <p:ext uri="{BB962C8B-B14F-4D97-AF65-F5344CB8AC3E}">
+        <p14:creationId xmlns:p14="http://schemas.microsoft.com/office/powerpoint/2010/main" val="2178485522"/>
+      </p:ext>
+    </p:extLst>
+  </p:cSld>
+  <p:clrMapOvr>
+    <a:masterClrMapping/>
+  </p:clrMapOvr>
+</p:notes>
+</file>
+
+<file path=ppt/notesSlides/notesSlide3.xml><?xml version="1.0" encoding="utf-8"?>
+<p:notes xmlns:a="http://schemas.openxmlformats.org/drawingml/2006/main" xmlns:r="http://schemas.openxmlformats.org/officeDocument/2006/relationships" xmlns:p="http://schemas.openxmlformats.org/presentationml/2006/main">
+  <p:cSld>
+    <p:spTree>
+      <p:nvGrpSpPr>
+        <p:cNvPr id="1" name=""/>
+        <p:cNvGrpSpPr/>
+        <p:nvPr/>
+      </p:nvGrpSpPr>
+      <p:grpSpPr>
+        <a:xfrm>
+          <a:off x="0" y="0"/>
+          <a:ext cx="0" cy="0"/>
+          <a:chOff x="0" y="0"/>
+          <a:chExt cx="0" cy="0"/>
+        </a:xfrm>
+      </p:grpSpPr>
+      <p:sp>
+        <p:nvSpPr>
+          <p:cNvPr id="2" name="Slide Image Placeholder 1"/>
+          <p:cNvSpPr>
+            <a:spLocks noGrp="1" noRot="1" noChangeAspect="1"/>
+          </p:cNvSpPr>
+          <p:nvPr>
+            <p:ph type="sldImg"/>
+          </p:nvPr>
+        </p:nvSpPr>
+        <p:spPr/>
+      </p:sp>
+      <p:sp>
+        <p:nvSpPr>
+          <p:cNvPr id="3" name="Notes Placeholder 2"/>
+          <p:cNvSpPr>
+            <a:spLocks noGrp="1"/>
+          </p:cNvSpPr>
+          <p:nvPr>
+            <p:ph type="body" idx="1"/>
+          </p:nvPr>
+        </p:nvSpPr>
+        <p:spPr/>
+        <p:txBody>
+          <a:bodyPr/>
+          <a:lstStyle/>
+          <a:p>
             <a:endParaRPr lang="en-US" dirty="0"/>
           </a:p>
         </p:txBody>
@@ -801,7 +969,7 @@
           <a:p>
             <a:fld id="{6D7D1AC5-EDA8-4631-9228-9906422CEF8D}" type="datetimeFigureOut">
               <a:rPr lang="en-US" smtClean="0"/>
-              <a:t>9/20/20</a:t>
+              <a:t>10/10/21</a:t>
             </a:fld>
             <a:endParaRPr lang="en-US"/>
           </a:p>
@@ -969,7 +1137,7 @@
           <a:p>
             <a:fld id="{6D7D1AC5-EDA8-4631-9228-9906422CEF8D}" type="datetimeFigureOut">
               <a:rPr lang="en-US" smtClean="0"/>
-              <a:t>9/20/20</a:t>
+              <a:t>10/10/21</a:t>
             </a:fld>
             <a:endParaRPr lang="en-US"/>
           </a:p>
@@ -1147,7 +1315,7 @@
           <a:p>
             <a:fld id="{6D7D1AC5-EDA8-4631-9228-9906422CEF8D}" type="datetimeFigureOut">
               <a:rPr lang="en-US" smtClean="0"/>
-              <a:t>9/20/20</a:t>
+              <a:t>10/10/21</a:t>
             </a:fld>
             <a:endParaRPr lang="en-US"/>
           </a:p>
@@ -1386,7 +1554,7 @@
                 <a:tabLst/>
                 <a:defRPr/>
               </a:pPr>
-              <a:t>9/20/20</a:t>
+              <a:t>10/10/21</a:t>
             </a:fld>
             <a:endParaRPr kumimoji="0" lang="en-US" sz="1200" b="0" i="0" u="none" strike="noStrike" kern="1200" cap="none" spc="0" normalizeH="0" baseline="0" noProof="0">
               <a:ln>
@@ -1725,7 +1893,7 @@
                 <a:tabLst/>
                 <a:defRPr/>
               </a:pPr>
-              <a:t>9/20/20</a:t>
+              <a:t>10/10/21</a:t>
             </a:fld>
             <a:endParaRPr kumimoji="0" lang="en-US" sz="1200" b="0" i="0" u="none" strike="noStrike" kern="1200" cap="none" spc="0" normalizeH="0" baseline="0" noProof="0">
               <a:ln>
@@ -2130,7 +2298,7 @@
                 <a:tabLst/>
                 <a:defRPr/>
               </a:pPr>
-              <a:t>9/20/20</a:t>
+              <a:t>10/10/21</a:t>
             </a:fld>
             <a:endParaRPr kumimoji="0" lang="en-US" sz="1200" b="0" i="0" u="none" strike="noStrike" kern="1200" cap="none" spc="0" normalizeH="0" baseline="0" noProof="0">
               <a:ln>
@@ -2519,7 +2687,7 @@
                 <a:tabLst/>
                 <a:defRPr/>
               </a:pPr>
-              <a:t>9/20/20</a:t>
+              <a:t>10/10/21</a:t>
             </a:fld>
             <a:endParaRPr kumimoji="0" lang="en-US" sz="1200" b="0" i="0" u="none" strike="noStrike" kern="1200" cap="none" spc="0" normalizeH="0" baseline="0" noProof="0">
               <a:ln>
@@ -3043,7 +3211,7 @@
                 <a:tabLst/>
                 <a:defRPr/>
               </a:pPr>
-              <a:t>9/20/20</a:t>
+              <a:t>10/10/21</a:t>
             </a:fld>
             <a:endParaRPr kumimoji="0" lang="en-US" sz="1200" b="0" i="0" u="none" strike="noStrike" kern="1200" cap="none" spc="0" normalizeH="0" baseline="0" noProof="0">
               <a:ln>
@@ -3320,7 +3488,7 @@
                 <a:tabLst/>
                 <a:defRPr/>
               </a:pPr>
-              <a:t>9/20/20</a:t>
+              <a:t>10/10/21</a:t>
             </a:fld>
             <a:endParaRPr kumimoji="0" lang="en-US" sz="1200" b="0" i="0" u="none" strike="noStrike" kern="1200" cap="none" spc="0" normalizeH="0" baseline="0" noProof="0">
               <a:ln>
@@ -3575,7 +3743,7 @@
                 <a:tabLst/>
                 <a:defRPr/>
               </a:pPr>
-              <a:t>9/20/20</a:t>
+              <a:t>10/10/21</a:t>
             </a:fld>
             <a:endParaRPr kumimoji="0" lang="en-US" sz="1200" b="0" i="0" u="none" strike="noStrike" kern="1200" cap="none" spc="0" normalizeH="0" baseline="0" noProof="0">
               <a:ln>
@@ -4010,7 +4178,7 @@
                 <a:tabLst/>
                 <a:defRPr/>
               </a:pPr>
-              <a:t>9/20/20</a:t>
+              <a:t>10/10/21</a:t>
             </a:fld>
             <a:endParaRPr kumimoji="0" lang="en-US" sz="1200" b="0" i="0" u="none" strike="noStrike" kern="1200" cap="none" spc="0" normalizeH="0" baseline="0" noProof="0">
               <a:ln>
@@ -4289,7 +4457,7 @@
           <a:p>
             <a:fld id="{6D7D1AC5-EDA8-4631-9228-9906422CEF8D}" type="datetimeFigureOut">
               <a:rPr lang="en-US" smtClean="0"/>
-              <a:t>9/20/20</a:t>
+              <a:t>10/10/21</a:t>
             </a:fld>
             <a:endParaRPr lang="en-US"/>
           </a:p>
@@ -4590,7 +4758,7 @@
                 <a:tabLst/>
                 <a:defRPr/>
               </a:pPr>
-              <a:t>9/20/20</a:t>
+              <a:t>10/10/21</a:t>
             </a:fld>
             <a:endParaRPr kumimoji="0" lang="en-US" sz="1200" b="0" i="0" u="none" strike="noStrike" kern="1200" cap="none" spc="0" normalizeH="0" baseline="0" noProof="0">
               <a:ln>
@@ -4918,7 +5086,7 @@
                 <a:tabLst/>
                 <a:defRPr/>
               </a:pPr>
-              <a:t>9/20/20</a:t>
+              <a:t>10/10/21</a:t>
             </a:fld>
             <a:endParaRPr kumimoji="0" lang="en-US" sz="1200" b="0" i="0" u="none" strike="noStrike" kern="1200" cap="none" spc="0" normalizeH="0" baseline="0" noProof="0">
               <a:ln>
@@ -5256,7 +5424,7 @@
                 <a:tabLst/>
                 <a:defRPr/>
               </a:pPr>
-              <a:t>9/20/20</a:t>
+              <a:t>10/10/21</a:t>
             </a:fld>
             <a:endParaRPr kumimoji="0" lang="en-US" sz="1200" b="0" i="0" u="none" strike="noStrike" kern="1200" cap="none" spc="0" normalizeH="0" baseline="0" noProof="0">
               <a:ln>
@@ -5612,7 +5780,7 @@
           <a:p>
             <a:fld id="{6D7D1AC5-EDA8-4631-9228-9906422CEF8D}" type="datetimeFigureOut">
               <a:rPr lang="en-US" smtClean="0"/>
-              <a:t>9/20/20</a:t>
+              <a:t>10/10/21</a:t>
             </a:fld>
             <a:endParaRPr lang="en-US"/>
           </a:p>
@@ -5841,7 +6009,7 @@
           <a:p>
             <a:fld id="{6D7D1AC5-EDA8-4631-9228-9906422CEF8D}" type="datetimeFigureOut">
               <a:rPr lang="en-US" smtClean="0"/>
-              <a:t>9/20/20</a:t>
+              <a:t>10/10/21</a:t>
             </a:fld>
             <a:endParaRPr lang="en-US"/>
           </a:p>
@@ -6205,7 +6373,7 @@
           <a:p>
             <a:fld id="{6D7D1AC5-EDA8-4631-9228-9906422CEF8D}" type="datetimeFigureOut">
               <a:rPr lang="en-US" smtClean="0"/>
-              <a:t>9/20/20</a:t>
+              <a:t>10/10/21</a:t>
             </a:fld>
             <a:endParaRPr lang="en-US"/>
           </a:p>
@@ -6322,7 +6490,7 @@
           <a:p>
             <a:fld id="{6D7D1AC5-EDA8-4631-9228-9906422CEF8D}" type="datetimeFigureOut">
               <a:rPr lang="en-US" smtClean="0"/>
-              <a:t>9/20/20</a:t>
+              <a:t>10/10/21</a:t>
             </a:fld>
             <a:endParaRPr lang="en-US"/>
           </a:p>
@@ -6417,7 +6585,7 @@
           <a:p>
             <a:fld id="{6D7D1AC5-EDA8-4631-9228-9906422CEF8D}" type="datetimeFigureOut">
               <a:rPr lang="en-US" smtClean="0"/>
-              <a:t>9/20/20</a:t>
+              <a:t>10/10/21</a:t>
             </a:fld>
             <a:endParaRPr lang="en-US"/>
           </a:p>
@@ -6692,7 +6860,7 @@
           <a:p>
             <a:fld id="{6D7D1AC5-EDA8-4631-9228-9906422CEF8D}" type="datetimeFigureOut">
               <a:rPr lang="en-US" smtClean="0"/>
-              <a:t>9/20/20</a:t>
+              <a:t>10/10/21</a:t>
             </a:fld>
             <a:endParaRPr lang="en-US"/>
           </a:p>
@@ -6944,7 +7112,7 @@
           <a:p>
             <a:fld id="{6D7D1AC5-EDA8-4631-9228-9906422CEF8D}" type="datetimeFigureOut">
               <a:rPr lang="en-US" smtClean="0"/>
-              <a:t>9/20/20</a:t>
+              <a:t>10/10/21</a:t>
             </a:fld>
             <a:endParaRPr lang="en-US"/>
           </a:p>
@@ -7155,7 +7323,7 @@
           <a:p>
             <a:fld id="{6D7D1AC5-EDA8-4631-9228-9906422CEF8D}" type="datetimeFigureOut">
               <a:rPr lang="en-US" smtClean="0"/>
-              <a:t>9/20/20</a:t>
+              <a:t>10/10/21</a:t>
             </a:fld>
             <a:endParaRPr lang="en-US"/>
           </a:p>
@@ -7742,7 +7910,7 @@
                 <a:tabLst/>
                 <a:defRPr/>
               </a:pPr>
-              <a:t>9/20/20</a:t>
+              <a:t>10/10/21</a:t>
             </a:fld>
             <a:endParaRPr kumimoji="0" lang="en-US" sz="1200" b="0" i="0" u="none" strike="noStrike" kern="1200" cap="none" spc="0" normalizeH="0" baseline="0" noProof="0">
               <a:ln>
@@ -8283,15 +8451,7 @@
             <a:pPr algn="l"/>
             <a:r>
               <a:rPr lang="en-US" sz="7200" dirty="0"/>
-              <a:t>Enterprise </a:t>
-            </a:r>
-            <a:r>
-              <a:rPr lang="en-US" sz="7200" dirty="0" err="1"/>
-              <a:t>Programmering</a:t>
-            </a:r>
-            <a:r>
-              <a:rPr lang="en-US" sz="7200" dirty="0"/>
-              <a:t> 2</a:t>
+              <a:t>Enterprise Programming 2</a:t>
             </a:r>
             <a:br>
               <a:rPr lang="en-US" sz="7200" dirty="0"/>
@@ -8335,16 +8495,12 @@
           <a:p>
             <a:pPr algn="r"/>
             <a:r>
-              <a:rPr lang="en-US" sz="2800"/>
-              <a:t>Prof. </a:t>
-            </a:r>
-            <a:r>
               <a:rPr lang="en-US" sz="2800" dirty="0"/>
-              <a:t>Andrea </a:t>
+              <a:t>Bogdan </a:t>
             </a:r>
             <a:r>
               <a:rPr lang="en-US" sz="2800" dirty="0" err="1"/>
-              <a:t>Arcuri</a:t>
+              <a:t>Marculescu</a:t>
             </a:r>
             <a:endParaRPr lang="en-US" sz="2800" dirty="0"/>
           </a:p>
@@ -8999,7 +9155,7 @@
             </a:r>
             <a:r>
               <a:rPr lang="en-US" sz="2800" dirty="0"/>
-              <a:t> year student can do by his/her own or in a group of few students over a couple of months is by definition “small”…</a:t>
+              <a:t> year student can do on their own or in a group of few students over a couple of months is by definition “small”…</a:t>
             </a:r>
           </a:p>
         </p:txBody>
@@ -18211,10 +18367,38 @@
             <p:ph type="title"/>
           </p:nvPr>
         </p:nvSpPr>
+        <p:spPr/>
+        <p:txBody>
+          <a:bodyPr>
+            <a:normAutofit/>
+          </a:bodyPr>
+          <a:lstStyle/>
+          <a:p>
+            <a:r>
+              <a:rPr lang="en-US" sz="6600" dirty="0" err="1"/>
+              <a:t>MicroServices</a:t>
+            </a:r>
+            <a:r>
+              <a:rPr lang="en-US" sz="6600" dirty="0"/>
+              <a:t> in a Nutshell</a:t>
+            </a:r>
+          </a:p>
+        </p:txBody>
+      </p:sp>
+      <p:sp>
+        <p:nvSpPr>
+          <p:cNvPr id="3" name="Content Placeholder 2"/>
+          <p:cNvSpPr>
+            <a:spLocks noGrp="1"/>
+          </p:cNvSpPr>
+          <p:nvPr>
+            <p:ph idx="1"/>
+          </p:nvPr>
+        </p:nvSpPr>
         <p:spPr>
           <a:xfrm>
-            <a:off x="135467" y="365125"/>
-            <a:ext cx="11811000" cy="1460500"/>
+            <a:off x="262647" y="1832110"/>
+            <a:ext cx="11743086" cy="5025890"/>
           </a:xfrm>
         </p:spPr>
         <p:txBody>
@@ -18224,151 +18408,109 @@
           <a:lstStyle/>
           <a:p>
             <a:r>
-              <a:rPr lang="en-US" sz="6600" dirty="0"/>
-              <a:t>Fallacies of Distributed Computing</a:t>
-            </a:r>
-          </a:p>
-        </p:txBody>
-      </p:sp>
-      <p:sp>
-        <p:nvSpPr>
-          <p:cNvPr id="3" name="Content Placeholder 2"/>
-          <p:cNvSpPr>
-            <a:spLocks noGrp="1"/>
-          </p:cNvSpPr>
-          <p:nvPr>
-            <p:ph idx="1"/>
-          </p:nvPr>
-        </p:nvSpPr>
-        <p:spPr>
-          <a:xfrm>
-            <a:off x="228599" y="1825625"/>
-            <a:ext cx="11599334" cy="4219575"/>
-          </a:xfrm>
-        </p:spPr>
-        <p:txBody>
-          <a:bodyPr>
-            <a:noAutofit/>
-          </a:bodyPr>
-          <a:lstStyle/>
-          <a:p>
-            <a:pPr marL="514350" indent="-514350">
-              <a:buFont typeface="+mj-lt"/>
-              <a:buAutoNum type="arabicPeriod"/>
-            </a:pPr>
-            <a:r>
-              <a:rPr lang="en-US" dirty="0"/>
-              <a:t>The network is reliable.</a:t>
-            </a:r>
-          </a:p>
-          <a:p>
-            <a:pPr marL="514350" indent="-514350">
-              <a:buFont typeface="+mj-lt"/>
-              <a:buAutoNum type="arabicPeriod"/>
-            </a:pPr>
-            <a:r>
-              <a:rPr lang="en-US" dirty="0"/>
-              <a:t>Latency is zero.</a:t>
-            </a:r>
-          </a:p>
-          <a:p>
-            <a:pPr marL="514350" indent="-514350">
-              <a:buFont typeface="+mj-lt"/>
-              <a:buAutoNum type="arabicPeriod"/>
-            </a:pPr>
-            <a:r>
-              <a:rPr lang="en-US" dirty="0"/>
-              <a:t>Bandwidth is infinite.</a:t>
-            </a:r>
-          </a:p>
-          <a:p>
-            <a:pPr marL="514350" indent="-514350">
-              <a:buFont typeface="+mj-lt"/>
-              <a:buAutoNum type="arabicPeriod"/>
-            </a:pPr>
-            <a:r>
-              <a:rPr lang="en-US" dirty="0"/>
-              <a:t>The network is secure.</a:t>
-            </a:r>
-          </a:p>
-          <a:p>
-            <a:pPr marL="514350" indent="-514350">
-              <a:buFont typeface="+mj-lt"/>
-              <a:buAutoNum type="arabicPeriod"/>
-            </a:pPr>
-            <a:r>
-              <a:rPr lang="en-US" dirty="0"/>
-              <a:t>Topology doesn't change.</a:t>
-            </a:r>
-          </a:p>
-          <a:p>
-            <a:pPr marL="514350" indent="-514350">
-              <a:buFont typeface="+mj-lt"/>
-              <a:buAutoNum type="arabicPeriod"/>
-            </a:pPr>
-            <a:r>
-              <a:rPr lang="en-US" dirty="0"/>
-              <a:t>There is one administrator.</a:t>
-            </a:r>
-          </a:p>
-          <a:p>
-            <a:pPr marL="514350" indent="-514350">
-              <a:buFont typeface="+mj-lt"/>
-              <a:buAutoNum type="arabicPeriod"/>
-            </a:pPr>
-            <a:r>
-              <a:rPr lang="en-US" dirty="0"/>
-              <a:t>Transport cost is zero.</a:t>
-            </a:r>
-          </a:p>
-          <a:p>
-            <a:pPr marL="514350" indent="-514350">
-              <a:buFont typeface="+mj-lt"/>
-              <a:buAutoNum type="arabicPeriod"/>
-            </a:pPr>
-            <a:r>
-              <a:rPr lang="en-US" dirty="0"/>
-              <a:t>The network is homogeneous.</a:t>
-            </a:r>
-          </a:p>
-          <a:p>
-            <a:pPr marL="514350" indent="-514350">
-              <a:buFont typeface="+mj-lt"/>
-              <a:buAutoNum type="arabicPeriod"/>
-            </a:pPr>
-            <a:endParaRPr lang="en-US" dirty="0"/>
-          </a:p>
-          <a:p>
-            <a:pPr marL="0" indent="0">
-              <a:buNone/>
-            </a:pPr>
-            <a:r>
-              <a:rPr lang="en-US" dirty="0"/>
-              <a:t>https://</a:t>
-            </a:r>
-            <a:r>
-              <a:rPr lang="en-US" dirty="0" err="1"/>
-              <a:t>en.wikipedia.org</a:t>
-            </a:r>
-            <a:r>
-              <a:rPr lang="en-US" dirty="0"/>
-              <a:t>/wiki/</a:t>
-            </a:r>
-            <a:r>
-              <a:rPr lang="en-US" dirty="0" err="1"/>
-              <a:t>Fallacies_of_distributed_computing</a:t>
-            </a:r>
-            <a:br>
-              <a:rPr lang="en-US" dirty="0"/>
-            </a:br>
-            <a:endParaRPr lang="en-US" dirty="0"/>
+              <a:rPr lang="en-US" sz="3200" dirty="0"/>
+              <a:t>Divide your system in </a:t>
+            </a:r>
+            <a:r>
+              <a:rPr lang="en-US" sz="3200" i="1" dirty="0"/>
+              <a:t>independent</a:t>
+            </a:r>
+            <a:r>
+              <a:rPr lang="en-US" sz="3200" dirty="0"/>
+              <a:t> components, </a:t>
+            </a:r>
+            <a:r>
+              <a:rPr lang="en-US" sz="3200" dirty="0" err="1"/>
+              <a:t>ie</a:t>
+            </a:r>
+            <a:r>
+              <a:rPr lang="en-US" sz="3200" dirty="0"/>
+              <a:t> services</a:t>
+            </a:r>
+          </a:p>
+          <a:p>
+            <a:r>
+              <a:rPr lang="en-US" sz="3200" dirty="0"/>
+              <a:t>Each component should be </a:t>
+            </a:r>
+            <a:r>
+              <a:rPr lang="en-US" sz="3200" i="1" dirty="0" err="1"/>
+              <a:t>compilable</a:t>
+            </a:r>
+            <a:r>
+              <a:rPr lang="en-US" sz="3200" dirty="0"/>
+              <a:t> and </a:t>
+            </a:r>
+            <a:r>
+              <a:rPr lang="en-US" sz="3200" i="1" dirty="0"/>
+              <a:t>deployable</a:t>
+            </a:r>
+            <a:r>
+              <a:rPr lang="en-US" sz="3200" dirty="0"/>
+              <a:t> on its own</a:t>
+            </a:r>
+          </a:p>
+          <a:p>
+            <a:pPr lvl="1"/>
+            <a:r>
+              <a:rPr lang="en-US" sz="2800" dirty="0"/>
+              <a:t>Typically, but not necessarily, they are RESTful web services</a:t>
+            </a:r>
+          </a:p>
+          <a:p>
+            <a:r>
+              <a:rPr lang="en-US" sz="3200" dirty="0"/>
+              <a:t>How many components? </a:t>
+            </a:r>
+          </a:p>
+          <a:p>
+            <a:pPr lvl="1"/>
+            <a:r>
+              <a:rPr lang="en-US" sz="2800" dirty="0"/>
+              <a:t>“Two Pizza” rule: a team shouldn’t be bigger than what 2 pizzas could feed</a:t>
+            </a:r>
+          </a:p>
+          <a:p>
+            <a:pPr lvl="2"/>
+            <a:r>
+              <a:rPr lang="en-US" sz="2400" dirty="0"/>
+              <a:t>Actual rule coming from Amazon, a pioneer in </a:t>
+            </a:r>
+            <a:r>
+              <a:rPr lang="en-US" sz="2400" dirty="0" err="1"/>
+              <a:t>microservices</a:t>
+            </a:r>
+            <a:endParaRPr lang="en-US" sz="2400" dirty="0"/>
+          </a:p>
+          <a:p>
+            <a:r>
+              <a:rPr lang="en-US" sz="3200" dirty="0"/>
+              <a:t>Not uncommon having applications made by hundreds of components </a:t>
+            </a:r>
+          </a:p>
+          <a:p>
+            <a:r>
+              <a:rPr lang="en-US" sz="3200" dirty="0"/>
+              <a:t>Communications should be programming/OS agnostic</a:t>
+            </a:r>
+          </a:p>
+          <a:p>
+            <a:pPr lvl="1"/>
+            <a:r>
+              <a:rPr lang="en-US" sz="2800" dirty="0" err="1"/>
+              <a:t>Eg</a:t>
+            </a:r>
+            <a:r>
+              <a:rPr lang="en-US" sz="2800" dirty="0"/>
+              <a:t>, JSON/XML over HTTP</a:t>
+            </a:r>
           </a:p>
         </p:txBody>
       </p:sp>
     </p:spTree>
     <p:extLst>
       <p:ext uri="{BB962C8B-B14F-4D97-AF65-F5344CB8AC3E}">
-        <p14:creationId xmlns:p14="http://schemas.microsoft.com/office/powerpoint/2010/main" val="1224952542"/>
+        <p14:creationId xmlns:p14="http://schemas.microsoft.com/office/powerpoint/2010/main" val="369040678"/>
       </p:ext>
     </p:extLst>
   </p:cSld>
@@ -18405,38 +18547,10 @@
             <p:ph type="title"/>
           </p:nvPr>
         </p:nvSpPr>
-        <p:spPr/>
-        <p:txBody>
-          <a:bodyPr>
-            <a:normAutofit/>
-          </a:bodyPr>
-          <a:lstStyle/>
-          <a:p>
-            <a:r>
-              <a:rPr lang="en-US" sz="6600" dirty="0" err="1"/>
-              <a:t>MicroServices</a:t>
-            </a:r>
-            <a:r>
-              <a:rPr lang="en-US" sz="6600" dirty="0"/>
-              <a:t> in a Nutshell</a:t>
-            </a:r>
-          </a:p>
-        </p:txBody>
-      </p:sp>
-      <p:sp>
-        <p:nvSpPr>
-          <p:cNvPr id="3" name="Content Placeholder 2"/>
-          <p:cNvSpPr>
-            <a:spLocks noGrp="1"/>
-          </p:cNvSpPr>
-          <p:nvPr>
-            <p:ph idx="1"/>
-          </p:nvPr>
-        </p:nvSpPr>
         <p:spPr>
           <a:xfrm>
-            <a:off x="262647" y="1832110"/>
-            <a:ext cx="11743086" cy="5025890"/>
+            <a:off x="135467" y="365125"/>
+            <a:ext cx="11811000" cy="1460500"/>
           </a:xfrm>
         </p:spPr>
         <p:txBody>
@@ -18446,109 +18560,151 @@
           <a:lstStyle/>
           <a:p>
             <a:r>
-              <a:rPr lang="en-US" sz="3200" dirty="0"/>
-              <a:t>Divide your system in </a:t>
-            </a:r>
-            <a:r>
-              <a:rPr lang="en-US" sz="3200" i="1" dirty="0"/>
-              <a:t>independent</a:t>
-            </a:r>
-            <a:r>
-              <a:rPr lang="en-US" sz="3200" dirty="0"/>
-              <a:t> components, </a:t>
-            </a:r>
-            <a:r>
-              <a:rPr lang="en-US" sz="3200" dirty="0" err="1"/>
-              <a:t>ie</a:t>
-            </a:r>
-            <a:r>
-              <a:rPr lang="en-US" sz="3200" dirty="0"/>
-              <a:t> services</a:t>
-            </a:r>
-          </a:p>
-          <a:p>
-            <a:r>
-              <a:rPr lang="en-US" sz="3200" dirty="0"/>
-              <a:t>Each component should be </a:t>
-            </a:r>
-            <a:r>
-              <a:rPr lang="en-US" sz="3200" i="1" dirty="0" err="1"/>
-              <a:t>compilable</a:t>
-            </a:r>
-            <a:r>
-              <a:rPr lang="en-US" sz="3200" dirty="0"/>
-              <a:t> and </a:t>
-            </a:r>
-            <a:r>
-              <a:rPr lang="en-US" sz="3200" i="1" dirty="0"/>
-              <a:t>deployable</a:t>
-            </a:r>
-            <a:r>
-              <a:rPr lang="en-US" sz="3200" dirty="0"/>
-              <a:t> on its own</a:t>
-            </a:r>
-          </a:p>
-          <a:p>
-            <a:pPr lvl="1"/>
-            <a:r>
-              <a:rPr lang="en-US" sz="2800" dirty="0"/>
-              <a:t>Typically, but not necessarily, they are RESTful web services</a:t>
-            </a:r>
-          </a:p>
-          <a:p>
-            <a:r>
-              <a:rPr lang="en-US" sz="3200" dirty="0"/>
-              <a:t>How many components? </a:t>
-            </a:r>
-          </a:p>
-          <a:p>
-            <a:pPr lvl="1"/>
-            <a:r>
-              <a:rPr lang="en-US" sz="2800" dirty="0"/>
-              <a:t>“Two Pizza” rule: a team shouldn’t be bigger than what 2 pizzas could feed</a:t>
-            </a:r>
-          </a:p>
-          <a:p>
-            <a:pPr lvl="2"/>
-            <a:r>
-              <a:rPr lang="en-US" sz="2400" dirty="0"/>
-              <a:t>Actual rule coming from Amazon, a pioneer in </a:t>
-            </a:r>
-            <a:r>
-              <a:rPr lang="en-US" sz="2400" dirty="0" err="1"/>
-              <a:t>microservices</a:t>
-            </a:r>
-            <a:endParaRPr lang="en-US" sz="2400" dirty="0"/>
-          </a:p>
-          <a:p>
-            <a:r>
-              <a:rPr lang="en-US" sz="3200" dirty="0"/>
-              <a:t>Not uncommon having applications made by hundreds of components </a:t>
-            </a:r>
-          </a:p>
-          <a:p>
-            <a:r>
-              <a:rPr lang="en-US" sz="3200" dirty="0"/>
-              <a:t>Communications should be programming/OS agnostic</a:t>
-            </a:r>
-          </a:p>
-          <a:p>
-            <a:pPr lvl="1"/>
-            <a:r>
-              <a:rPr lang="en-US" sz="2800" dirty="0" err="1"/>
-              <a:t>Eg</a:t>
-            </a:r>
-            <a:r>
-              <a:rPr lang="en-US" sz="2800" dirty="0"/>
-              <a:t>, JSON/XML over HTTP</a:t>
-            </a:r>
+              <a:rPr lang="en-US" sz="6600" dirty="0"/>
+              <a:t>Fallacies of Distributed Computing</a:t>
+            </a:r>
+          </a:p>
+        </p:txBody>
+      </p:sp>
+      <p:sp>
+        <p:nvSpPr>
+          <p:cNvPr id="3" name="Content Placeholder 2"/>
+          <p:cNvSpPr>
+            <a:spLocks noGrp="1"/>
+          </p:cNvSpPr>
+          <p:nvPr>
+            <p:ph idx="1"/>
+          </p:nvPr>
+        </p:nvSpPr>
+        <p:spPr>
+          <a:xfrm>
+            <a:off x="228599" y="1825625"/>
+            <a:ext cx="11599334" cy="4219575"/>
+          </a:xfrm>
+        </p:spPr>
+        <p:txBody>
+          <a:bodyPr>
+            <a:noAutofit/>
+          </a:bodyPr>
+          <a:lstStyle/>
+          <a:p>
+            <a:pPr marL="514350" indent="-514350">
+              <a:buFont typeface="+mj-lt"/>
+              <a:buAutoNum type="arabicPeriod"/>
+            </a:pPr>
+            <a:r>
+              <a:rPr lang="en-US" dirty="0"/>
+              <a:t>The network is reliable.</a:t>
+            </a:r>
+          </a:p>
+          <a:p>
+            <a:pPr marL="514350" indent="-514350">
+              <a:buFont typeface="+mj-lt"/>
+              <a:buAutoNum type="arabicPeriod"/>
+            </a:pPr>
+            <a:r>
+              <a:rPr lang="en-US" dirty="0"/>
+              <a:t>Latency is zero.</a:t>
+            </a:r>
+          </a:p>
+          <a:p>
+            <a:pPr marL="514350" indent="-514350">
+              <a:buFont typeface="+mj-lt"/>
+              <a:buAutoNum type="arabicPeriod"/>
+            </a:pPr>
+            <a:r>
+              <a:rPr lang="en-US" dirty="0"/>
+              <a:t>Bandwidth is infinite.</a:t>
+            </a:r>
+          </a:p>
+          <a:p>
+            <a:pPr marL="514350" indent="-514350">
+              <a:buFont typeface="+mj-lt"/>
+              <a:buAutoNum type="arabicPeriod"/>
+            </a:pPr>
+            <a:r>
+              <a:rPr lang="en-US" dirty="0"/>
+              <a:t>The network is secure.</a:t>
+            </a:r>
+          </a:p>
+          <a:p>
+            <a:pPr marL="514350" indent="-514350">
+              <a:buFont typeface="+mj-lt"/>
+              <a:buAutoNum type="arabicPeriod"/>
+            </a:pPr>
+            <a:r>
+              <a:rPr lang="en-US" dirty="0"/>
+              <a:t>Topology doesn't change.</a:t>
+            </a:r>
+          </a:p>
+          <a:p>
+            <a:pPr marL="514350" indent="-514350">
+              <a:buFont typeface="+mj-lt"/>
+              <a:buAutoNum type="arabicPeriod"/>
+            </a:pPr>
+            <a:r>
+              <a:rPr lang="en-US" dirty="0"/>
+              <a:t>There is one administrator.</a:t>
+            </a:r>
+          </a:p>
+          <a:p>
+            <a:pPr marL="514350" indent="-514350">
+              <a:buFont typeface="+mj-lt"/>
+              <a:buAutoNum type="arabicPeriod"/>
+            </a:pPr>
+            <a:r>
+              <a:rPr lang="en-US" dirty="0"/>
+              <a:t>Transport cost is zero.</a:t>
+            </a:r>
+          </a:p>
+          <a:p>
+            <a:pPr marL="514350" indent="-514350">
+              <a:buFont typeface="+mj-lt"/>
+              <a:buAutoNum type="arabicPeriod"/>
+            </a:pPr>
+            <a:r>
+              <a:rPr lang="en-US" dirty="0"/>
+              <a:t>The network is homogeneous.</a:t>
+            </a:r>
+          </a:p>
+          <a:p>
+            <a:pPr marL="514350" indent="-514350">
+              <a:buFont typeface="+mj-lt"/>
+              <a:buAutoNum type="arabicPeriod"/>
+            </a:pPr>
+            <a:endParaRPr lang="en-US" dirty="0"/>
+          </a:p>
+          <a:p>
+            <a:pPr marL="0" indent="0">
+              <a:buNone/>
+            </a:pPr>
+            <a:r>
+              <a:rPr lang="en-US" dirty="0"/>
+              <a:t>https://</a:t>
+            </a:r>
+            <a:r>
+              <a:rPr lang="en-US" dirty="0" err="1"/>
+              <a:t>en.wikipedia.org</a:t>
+            </a:r>
+            <a:r>
+              <a:rPr lang="en-US" dirty="0"/>
+              <a:t>/wiki/</a:t>
+            </a:r>
+            <a:r>
+              <a:rPr lang="en-US" dirty="0" err="1"/>
+              <a:t>Fallacies_of_distributed_computing</a:t>
+            </a:r>
+            <a:br>
+              <a:rPr lang="en-US" dirty="0"/>
+            </a:br>
+            <a:endParaRPr lang="en-US" dirty="0"/>
           </a:p>
         </p:txBody>
       </p:sp>
     </p:spTree>
     <p:extLst>
       <p:ext uri="{BB962C8B-B14F-4D97-AF65-F5344CB8AC3E}">
-        <p14:creationId xmlns:p14="http://schemas.microsoft.com/office/powerpoint/2010/main" val="369040678"/>
+        <p14:creationId xmlns:p14="http://schemas.microsoft.com/office/powerpoint/2010/main" val="1224952542"/>
       </p:ext>
     </p:extLst>
   </p:cSld>

</xml_diff>